<commit_message>
Refactored to parametrize the PMML file.
</commit_message>
<xml_diff>
--- a/docs/Decisions with ODM and Predictive Model.pptx
+++ b/docs/Decisions with ODM and Predictive Model.pptx
@@ -5,13 +5,14 @@
     <p:sldMasterId id="2147483781" r:id="rId1"/>
   </p:sldMasterIdLst>
   <p:notesMasterIdLst>
-    <p:notesMasterId r:id="rId6"/>
+    <p:notesMasterId r:id="rId7"/>
   </p:notesMasterIdLst>
   <p:sldIdLst>
     <p:sldId id="512" r:id="rId2"/>
     <p:sldId id="595" r:id="rId3"/>
     <p:sldId id="596" r:id="rId4"/>
-    <p:sldId id="511" r:id="rId5"/>
+    <p:sldId id="597" r:id="rId5"/>
+    <p:sldId id="511" r:id="rId6"/>
   </p:sldIdLst>
   <p:sldSz cx="9144000" cy="5143500" type="screen16x9"/>
   <p:notesSz cx="6858000" cy="9144000"/>
@@ -211,7 +212,7 @@
           <a:p>
             <a:fld id="{26BE012A-D992-5D42-B86E-AA2BC0764EE1}" type="datetimeFigureOut">
               <a:rPr lang="en-US" smtClean="0"/>
-              <a:t>10/9/2018</a:t>
+              <a:t>10/11/2018</a:t>
             </a:fld>
             <a:endParaRPr lang="en-US"/>
           </a:p>
@@ -652,7 +653,7 @@
           <p:cNvPr id="12" name="Picture 11">
             <a:extLst>
               <a:ext uri="{FF2B5EF4-FFF2-40B4-BE49-F238E27FC236}">
-                <a16:creationId xmlns="" xmlns:a16="http://schemas.microsoft.com/office/drawing/2014/main" id="{022AB0AE-B28A-4A96-AAD3-D392D347F72A}"/>
+                <a16:creationId xmlns:a16="http://schemas.microsoft.com/office/drawing/2014/main" xmlns="" id="{022AB0AE-B28A-4A96-AAD3-D392D347F72A}"/>
               </a:ext>
             </a:extLst>
           </p:cNvPr>
@@ -757,7 +758,7 @@
           <p:cNvPr id="13" name="Picture 12">
             <a:extLst>
               <a:ext uri="{FF2B5EF4-FFF2-40B4-BE49-F238E27FC236}">
-                <a16:creationId xmlns="" xmlns:a16="http://schemas.microsoft.com/office/drawing/2014/main" id="{CD378CF6-5562-4A2B-9A64-88D2566A964B}"/>
+                <a16:creationId xmlns:a16="http://schemas.microsoft.com/office/drawing/2014/main" xmlns="" id="{CD378CF6-5562-4A2B-9A64-88D2566A964B}"/>
               </a:ext>
             </a:extLst>
           </p:cNvPr>
@@ -4363,10 +4364,395 @@
   <p:clrMapOvr>
     <a:masterClrMapping/>
   </p:clrMapOvr>
+  <p:timing>
+    <p:tnLst>
+      <p:par>
+        <p:cTn id="1" dur="indefinite" restart="never" nodeType="tmRoot"/>
+      </p:par>
+    </p:tnLst>
+  </p:timing>
 </p:sld>
 </file>
 
 <file path=ppt/slides/slide4.xml><?xml version="1.0" encoding="utf-8"?>
+<p:sld xmlns:a="http://schemas.openxmlformats.org/drawingml/2006/main" xmlns:r="http://schemas.openxmlformats.org/officeDocument/2006/relationships" xmlns:p="http://schemas.openxmlformats.org/presentationml/2006/main">
+  <p:cSld>
+    <p:spTree>
+      <p:nvGrpSpPr>
+        <p:cNvPr id="1" name=""/>
+        <p:cNvGrpSpPr/>
+        <p:nvPr/>
+      </p:nvGrpSpPr>
+      <p:grpSpPr>
+        <a:xfrm>
+          <a:off x="0" y="0"/>
+          <a:ext cx="0" cy="0"/>
+          <a:chOff x="0" y="0"/>
+          <a:chExt cx="0" cy="0"/>
+        </a:xfrm>
+      </p:grpSpPr>
+      <p:sp>
+        <p:nvSpPr>
+          <p:cNvPr id="2" name="Title 1"/>
+          <p:cNvSpPr>
+            <a:spLocks noGrp="1"/>
+          </p:cNvSpPr>
+          <p:nvPr>
+            <p:ph type="title"/>
+          </p:nvPr>
+        </p:nvSpPr>
+        <p:spPr/>
+        <p:txBody>
+          <a:bodyPr/>
+          <a:lstStyle/>
+          <a:p>
+            <a:r>
+              <a:rPr lang="en-US" dirty="0" smtClean="0"/>
+              <a:t>What-if: running simulations in ODM</a:t>
+            </a:r>
+            <a:endParaRPr lang="en-US" dirty="0"/>
+          </a:p>
+        </p:txBody>
+      </p:sp>
+      <p:sp>
+        <p:nvSpPr>
+          <p:cNvPr id="3" name="Slide Number Placeholder 2"/>
+          <p:cNvSpPr>
+            <a:spLocks noGrp="1"/>
+          </p:cNvSpPr>
+          <p:nvPr>
+            <p:ph type="sldNum" sz="quarter" idx="10"/>
+          </p:nvPr>
+        </p:nvSpPr>
+        <p:spPr/>
+        <p:txBody>
+          <a:bodyPr/>
+          <a:lstStyle/>
+          <a:p>
+            <a:fld id="{D0BE6F14-FF48-0F4F-A8AA-2E3F25371E4A}" type="slidenum">
+              <a:rPr lang="en-US" smtClean="0"/>
+              <a:pPr/>
+              <a:t>4</a:t>
+            </a:fld>
+            <a:endParaRPr lang="en-US"/>
+          </a:p>
+        </p:txBody>
+      </p:sp>
+      <p:sp>
+        <p:nvSpPr>
+          <p:cNvPr id="5" name="Footer Placeholder 4"/>
+          <p:cNvSpPr>
+            <a:spLocks noGrp="1"/>
+          </p:cNvSpPr>
+          <p:nvPr>
+            <p:ph type="ftr" sz="quarter" idx="14"/>
+          </p:nvPr>
+        </p:nvSpPr>
+        <p:spPr/>
+        <p:txBody>
+          <a:bodyPr/>
+          <a:lstStyle/>
+          <a:p>
+            <a:r>
+              <a:rPr lang="de-DE" smtClean="0"/>
+              <a:t>Digital Business Automation - © 2018 IBM Corporation</a:t>
+            </a:r>
+            <a:endParaRPr lang="en-US" dirty="0"/>
+          </a:p>
+        </p:txBody>
+      </p:sp>
+      <p:pic>
+        <p:nvPicPr>
+          <p:cNvPr id="7" name="Picture 6"/>
+          <p:cNvPicPr>
+            <a:picLocks noChangeAspect="1"/>
+          </p:cNvPicPr>
+          <p:nvPr/>
+        </p:nvPicPr>
+        <p:blipFill>
+          <a:blip r:embed="rId2"/>
+          <a:stretch>
+            <a:fillRect/>
+          </a:stretch>
+        </p:blipFill>
+        <p:spPr>
+          <a:xfrm>
+            <a:off x="1856919" y="664203"/>
+            <a:ext cx="5190604" cy="4104054"/>
+          </a:xfrm>
+          <a:prstGeom prst="rect">
+            <a:avLst/>
+          </a:prstGeom>
+          <a:ln>
+            <a:solidFill>
+              <a:schemeClr val="accent1"/>
+            </a:solidFill>
+          </a:ln>
+        </p:spPr>
+      </p:pic>
+      <p:sp>
+        <p:nvSpPr>
+          <p:cNvPr id="10" name="Rectangle 9"/>
+          <p:cNvSpPr/>
+          <p:nvPr/>
+        </p:nvSpPr>
+        <p:spPr>
+          <a:xfrm>
+            <a:off x="7240065" y="2319602"/>
+            <a:ext cx="1592376" cy="642551"/>
+          </a:xfrm>
+          <a:prstGeom prst="rect">
+            <a:avLst/>
+          </a:prstGeom>
+          <a:ln w="28575">
+            <a:solidFill>
+              <a:schemeClr val="accent2">
+                <a:lumMod val="50000"/>
+              </a:schemeClr>
+            </a:solidFill>
+          </a:ln>
+        </p:spPr>
+        <p:txBody>
+          <a:bodyPr wrap="square" lIns="0" tIns="0" rIns="0" bIns="0" rtlCol="0" anchor="ctr">
+            <a:noAutofit/>
+          </a:bodyPr>
+          <a:lstStyle/>
+          <a:p>
+            <a:pPr algn="ctr"/>
+            <a:r>
+              <a:rPr lang="en-US" sz="1200" dirty="0" smtClean="0">
+                <a:solidFill>
+                  <a:schemeClr val="accent2">
+                    <a:lumMod val="50000"/>
+                  </a:schemeClr>
+                </a:solidFill>
+                <a:latin typeface="Arial"/>
+                <a:cs typeface="Arial"/>
+              </a:rPr>
+              <a:t>Run scenarios</a:t>
+            </a:r>
+          </a:p>
+          <a:p>
+            <a:pPr algn="ctr"/>
+            <a:r>
+              <a:rPr lang="en-US" sz="1200" dirty="0">
+                <a:solidFill>
+                  <a:schemeClr val="accent2">
+                    <a:lumMod val="50000"/>
+                  </a:schemeClr>
+                </a:solidFill>
+                <a:latin typeface="Arial"/>
+                <a:cs typeface="Arial"/>
+              </a:rPr>
+              <a:t>w</a:t>
+            </a:r>
+            <a:r>
+              <a:rPr lang="en-US" sz="1200" dirty="0" smtClean="0">
+                <a:solidFill>
+                  <a:schemeClr val="accent2">
+                    <a:lumMod val="50000"/>
+                  </a:schemeClr>
+                </a:solidFill>
+                <a:latin typeface="Arial"/>
+                <a:cs typeface="Arial"/>
+              </a:rPr>
+              <a:t>ithout adjustment</a:t>
+            </a:r>
+            <a:endParaRPr lang="en-US" sz="1200" dirty="0" smtClean="0">
+              <a:solidFill>
+                <a:schemeClr val="accent2">
+                  <a:lumMod val="50000"/>
+                </a:schemeClr>
+              </a:solidFill>
+              <a:latin typeface="Arial"/>
+              <a:cs typeface="Arial"/>
+            </a:endParaRPr>
+          </a:p>
+        </p:txBody>
+      </p:sp>
+      <p:cxnSp>
+        <p:nvCxnSpPr>
+          <p:cNvPr id="11" name="Straight Arrow Connector 8"/>
+          <p:cNvCxnSpPr>
+            <a:stCxn id="10" idx="2"/>
+          </p:cNvCxnSpPr>
+          <p:nvPr/>
+        </p:nvCxnSpPr>
+        <p:spPr>
+          <a:xfrm rot="5400000">
+            <a:off x="7316099" y="2693577"/>
+            <a:ext cx="451579" cy="988730"/>
+          </a:xfrm>
+          <a:prstGeom prst="bentConnector2">
+            <a:avLst/>
+          </a:prstGeom>
+          <a:ln w="28575">
+            <a:solidFill>
+              <a:schemeClr val="accent2">
+                <a:lumMod val="50000"/>
+              </a:schemeClr>
+            </a:solidFill>
+            <a:headEnd type="arrow" w="med" len="med"/>
+            <a:tailEnd type="none" w="med" len="med"/>
+          </a:ln>
+        </p:spPr>
+        <p:style>
+          <a:lnRef idx="2">
+            <a:schemeClr val="accent1"/>
+          </a:lnRef>
+          <a:fillRef idx="0">
+            <a:schemeClr val="accent1"/>
+          </a:fillRef>
+          <a:effectRef idx="1">
+            <a:schemeClr val="accent1"/>
+          </a:effectRef>
+          <a:fontRef idx="minor">
+            <a:schemeClr val="tx1"/>
+          </a:fontRef>
+        </p:style>
+      </p:cxnSp>
+      <p:sp>
+        <p:nvSpPr>
+          <p:cNvPr id="13" name="Rectangle 12"/>
+          <p:cNvSpPr/>
+          <p:nvPr/>
+        </p:nvSpPr>
+        <p:spPr>
+          <a:xfrm>
+            <a:off x="72001" y="2319602"/>
+            <a:ext cx="1592376" cy="642551"/>
+          </a:xfrm>
+          <a:prstGeom prst="rect">
+            <a:avLst/>
+          </a:prstGeom>
+          <a:ln w="28575">
+            <a:solidFill>
+              <a:schemeClr val="accent2">
+                <a:lumMod val="50000"/>
+              </a:schemeClr>
+            </a:solidFill>
+          </a:ln>
+        </p:spPr>
+        <p:txBody>
+          <a:bodyPr wrap="square" lIns="0" tIns="0" rIns="0" bIns="0" rtlCol="0" anchor="ctr">
+            <a:noAutofit/>
+          </a:bodyPr>
+          <a:lstStyle/>
+          <a:p>
+            <a:pPr algn="ctr"/>
+            <a:r>
+              <a:rPr lang="en-US" sz="1200" dirty="0" smtClean="0">
+                <a:solidFill>
+                  <a:schemeClr val="accent2">
+                    <a:lumMod val="50000"/>
+                  </a:schemeClr>
+                </a:solidFill>
+                <a:latin typeface="Arial"/>
+                <a:cs typeface="Arial"/>
+              </a:rPr>
+              <a:t>Run scenarios</a:t>
+            </a:r>
+          </a:p>
+          <a:p>
+            <a:pPr algn="ctr"/>
+            <a:r>
+              <a:rPr lang="en-US" sz="1200" dirty="0" smtClean="0">
+                <a:solidFill>
+                  <a:schemeClr val="accent2">
+                    <a:lumMod val="50000"/>
+                  </a:schemeClr>
+                </a:solidFill>
+                <a:latin typeface="Arial"/>
+                <a:cs typeface="Arial"/>
+              </a:rPr>
+              <a:t>W</a:t>
+            </a:r>
+            <a:r>
+              <a:rPr lang="en-US" sz="1200" dirty="0" smtClean="0">
+                <a:solidFill>
+                  <a:schemeClr val="accent2">
+                    <a:lumMod val="50000"/>
+                  </a:schemeClr>
+                </a:solidFill>
+                <a:latin typeface="Arial"/>
+                <a:cs typeface="Arial"/>
+              </a:rPr>
+              <a:t>ith predictor</a:t>
+            </a:r>
+            <a:endParaRPr lang="en-US" sz="1200" dirty="0" smtClean="0">
+              <a:solidFill>
+                <a:schemeClr val="accent2">
+                  <a:lumMod val="50000"/>
+                </a:schemeClr>
+              </a:solidFill>
+              <a:latin typeface="Arial"/>
+              <a:cs typeface="Arial"/>
+            </a:endParaRPr>
+          </a:p>
+        </p:txBody>
+      </p:sp>
+      <p:cxnSp>
+        <p:nvCxnSpPr>
+          <p:cNvPr id="14" name="Straight Arrow Connector 8"/>
+          <p:cNvCxnSpPr>
+            <a:stCxn id="13" idx="2"/>
+          </p:cNvCxnSpPr>
+          <p:nvPr/>
+        </p:nvCxnSpPr>
+        <p:spPr>
+          <a:xfrm rot="16200000" flipH="1">
+            <a:off x="1136765" y="2693577"/>
+            <a:ext cx="451578" cy="988730"/>
+          </a:xfrm>
+          <a:prstGeom prst="bentConnector2">
+            <a:avLst/>
+          </a:prstGeom>
+          <a:ln w="28575">
+            <a:solidFill>
+              <a:schemeClr val="accent2">
+                <a:lumMod val="50000"/>
+              </a:schemeClr>
+            </a:solidFill>
+            <a:headEnd type="arrow" w="med" len="med"/>
+            <a:tailEnd type="none" w="med" len="med"/>
+          </a:ln>
+        </p:spPr>
+        <p:style>
+          <a:lnRef idx="2">
+            <a:schemeClr val="accent1"/>
+          </a:lnRef>
+          <a:fillRef idx="0">
+            <a:schemeClr val="accent1"/>
+          </a:fillRef>
+          <a:effectRef idx="1">
+            <a:schemeClr val="accent1"/>
+          </a:effectRef>
+          <a:fontRef idx="minor">
+            <a:schemeClr val="tx1"/>
+          </a:fontRef>
+        </p:style>
+      </p:cxnSp>
+    </p:spTree>
+    <p:extLst>
+      <p:ext uri="{BB962C8B-B14F-4D97-AF65-F5344CB8AC3E}">
+        <p14:creationId xmlns:p14="http://schemas.microsoft.com/office/powerpoint/2010/main" val="4165670593"/>
+      </p:ext>
+    </p:extLst>
+  </p:cSld>
+  <p:clrMapOvr>
+    <a:masterClrMapping/>
+  </p:clrMapOvr>
+  <p:timing>
+    <p:tnLst>
+      <p:par>
+        <p:cTn id="1" dur="indefinite" restart="never" nodeType="tmRoot"/>
+      </p:par>
+    </p:tnLst>
+  </p:timing>
+</p:sld>
+</file>
+
+<file path=ppt/slides/slide5.xml><?xml version="1.0" encoding="utf-8"?>
 <p:sld xmlns:a="http://schemas.openxmlformats.org/drawingml/2006/main" xmlns:r="http://schemas.openxmlformats.org/officeDocument/2006/relationships" xmlns:p="http://schemas.openxmlformats.org/presentationml/2006/main">
   <p:cSld>
     <p:spTree>
@@ -4446,7 +4832,7 @@
                 <a:tabLst/>
                 <a:defRPr/>
               </a:pPr>
-              <a:t>4</a:t>
+              <a:t>5</a:t>
             </a:fld>
             <a:endParaRPr kumimoji="0" lang="en-US" sz="600" b="0" i="0" u="none" strike="noStrike" kern="1200" cap="none" spc="0" normalizeH="0" baseline="0" noProof="0">
               <a:ln>

</xml_diff>